<commit_message>
Added ready implementations slide
</commit_message>
<xml_diff>
--- a/StringSimilarityDemo/StringSimilarityDemo.pptx
+++ b/StringSimilarityDemo/StringSimilarityDemo.pptx
@@ -5,10 +5,10 @@
     <p:sldMasterId id="2147483666" r:id="rId4"/>
   </p:sldMasterIdLst>
   <p:notesMasterIdLst>
-    <p:notesMasterId r:id="rId13"/>
+    <p:notesMasterId r:id="rId14"/>
   </p:notesMasterIdLst>
   <p:handoutMasterIdLst>
-    <p:handoutMasterId r:id="rId14"/>
+    <p:handoutMasterId r:id="rId15"/>
   </p:handoutMasterIdLst>
   <p:sldIdLst>
     <p:sldId id="256" r:id="rId5"/>
@@ -16,9 +16,10 @@
     <p:sldId id="289" r:id="rId7"/>
     <p:sldId id="278" r:id="rId8"/>
     <p:sldId id="264" r:id="rId9"/>
-    <p:sldId id="258" r:id="rId10"/>
-    <p:sldId id="290" r:id="rId11"/>
-    <p:sldId id="276" r:id="rId12"/>
+    <p:sldId id="291" r:id="rId10"/>
+    <p:sldId id="258" r:id="rId11"/>
+    <p:sldId id="290" r:id="rId12"/>
+    <p:sldId id="276" r:id="rId13"/>
   </p:sldIdLst>
   <p:sldSz cx="12192000" cy="6858000"/>
   <p:notesSz cx="6858000" cy="9144000"/>
@@ -17623,41 +17624,331 @@
       </p:grpSpPr>
       <p:sp>
         <p:nvSpPr>
-          <p:cNvPr id="2" name="Title 1">
-            <a:extLst>
-              <a:ext uri="{FF2B5EF4-FFF2-40B4-BE49-F238E27FC236}">
-                <a16:creationId xmlns:a16="http://schemas.microsoft.com/office/drawing/2014/main" id="{A29DE7F2-E890-4744-88DD-A75F5E300513}"/>
-              </a:ext>
-            </a:extLst>
-          </p:cNvPr>
-          <p:cNvSpPr>
-            <a:spLocks noGrp="1"/>
-          </p:cNvSpPr>
-          <p:nvPr>
-            <p:ph type="ctrTitle"/>
-          </p:nvPr>
-        </p:nvSpPr>
-        <p:spPr>
-          <a:xfrm>
-            <a:off x="6991350" y="2571235"/>
-            <a:ext cx="4179570" cy="1715531"/>
-          </a:xfrm>
-        </p:spPr>
+          <p:cNvPr id="3" name="Title 2">
+            <a:extLst>
+              <a:ext uri="{FF2B5EF4-FFF2-40B4-BE49-F238E27FC236}">
+                <a16:creationId xmlns:a16="http://schemas.microsoft.com/office/drawing/2014/main" id="{BFDA4FD1-BFCB-4F8B-900F-921A112FA4E1}"/>
+              </a:ext>
+            </a:extLst>
+          </p:cNvPr>
+          <p:cNvSpPr>
+            <a:spLocks noGrp="1"/>
+          </p:cNvSpPr>
+          <p:nvPr>
+            <p:ph type="title"/>
+          </p:nvPr>
+        </p:nvSpPr>
+        <p:spPr/>
         <p:txBody>
           <a:bodyPr/>
           <a:lstStyle/>
           <a:p>
             <a:r>
               <a:rPr lang="en-US" dirty="0"/>
-              <a:t>DEMO</a:t>
-            </a:r>
+              <a:t>Ready implementations</a:t>
+            </a:r>
+            <a:endParaRPr lang="LID4096" dirty="0"/>
+          </a:p>
+        </p:txBody>
+      </p:sp>
+      <p:sp>
+        <p:nvSpPr>
+          <p:cNvPr id="15" name="TextBox 14">
+            <a:extLst>
+              <a:ext uri="{FF2B5EF4-FFF2-40B4-BE49-F238E27FC236}">
+                <a16:creationId xmlns:a16="http://schemas.microsoft.com/office/drawing/2014/main" id="{EA30546A-7408-471D-B3EB-8E3F751845A2}"/>
+              </a:ext>
+            </a:extLst>
+          </p:cNvPr>
+          <p:cNvSpPr txBox="1"/>
+          <p:nvPr/>
+        </p:nvSpPr>
+        <p:spPr>
+          <a:xfrm>
+            <a:off x="3371088" y="2846832"/>
+            <a:ext cx="696794" cy="369332"/>
+          </a:xfrm>
+          <a:prstGeom prst="rect">
+            <a:avLst/>
+          </a:prstGeom>
+          <a:noFill/>
+        </p:spPr>
+        <p:txBody>
+          <a:bodyPr wrap="none" rtlCol="0">
+            <a:spAutoFit/>
+          </a:bodyPr>
+          <a:lstStyle/>
+          <a:p>
+            <a:r>
+              <a:rPr lang="en-US" dirty="0"/>
+              <a:t>TSQL</a:t>
+            </a:r>
+            <a:endParaRPr lang="LID4096" dirty="0"/>
+          </a:p>
+        </p:txBody>
+      </p:sp>
+      <p:sp>
+        <p:nvSpPr>
+          <p:cNvPr id="16" name="TextBox 15">
+            <a:extLst>
+              <a:ext uri="{FF2B5EF4-FFF2-40B4-BE49-F238E27FC236}">
+                <a16:creationId xmlns:a16="http://schemas.microsoft.com/office/drawing/2014/main" id="{744F4E1A-AB09-4591-B5E0-C40123587B81}"/>
+              </a:ext>
+            </a:extLst>
+          </p:cNvPr>
+          <p:cNvSpPr txBox="1"/>
+          <p:nvPr/>
+        </p:nvSpPr>
+        <p:spPr>
+          <a:xfrm>
+            <a:off x="5334000" y="3364992"/>
+            <a:ext cx="1215333" cy="369332"/>
+          </a:xfrm>
+          <a:prstGeom prst="rect">
+            <a:avLst/>
+          </a:prstGeom>
+          <a:noFill/>
+        </p:spPr>
+        <p:txBody>
+          <a:bodyPr wrap="none" rtlCol="0">
+            <a:spAutoFit/>
+          </a:bodyPr>
+          <a:lstStyle/>
+          <a:p>
+            <a:r>
+              <a:rPr lang="en-US" dirty="0"/>
+              <a:t>JavaScript</a:t>
+            </a:r>
+            <a:endParaRPr lang="LID4096" dirty="0"/>
+          </a:p>
+        </p:txBody>
+      </p:sp>
+      <p:sp>
+        <p:nvSpPr>
+          <p:cNvPr id="17" name="TextBox 16">
+            <a:extLst>
+              <a:ext uri="{FF2B5EF4-FFF2-40B4-BE49-F238E27FC236}">
+                <a16:creationId xmlns:a16="http://schemas.microsoft.com/office/drawing/2014/main" id="{01250A7E-DD91-4329-AA43-3819BBEA0A64}"/>
+              </a:ext>
+            </a:extLst>
+          </p:cNvPr>
+          <p:cNvSpPr txBox="1"/>
+          <p:nvPr/>
+        </p:nvSpPr>
+        <p:spPr>
+          <a:xfrm>
+            <a:off x="3284236" y="1701289"/>
+            <a:ext cx="5623527" cy="830997"/>
+          </a:xfrm>
+          <a:prstGeom prst="rect">
+            <a:avLst/>
+          </a:prstGeom>
+          <a:noFill/>
+        </p:spPr>
+        <p:txBody>
+          <a:bodyPr wrap="none" rtlCol="0">
+            <a:spAutoFit/>
+          </a:bodyPr>
+          <a:lstStyle/>
+          <a:p>
+            <a:pPr algn="ctr"/>
+            <a:r>
+              <a:rPr lang="en-US" sz="1600" i="1" dirty="0">
+                <a:solidFill>
+                  <a:schemeClr val="tx1">
+                    <a:lumMod val="50000"/>
+                    <a:lumOff val="50000"/>
+                  </a:schemeClr>
+                </a:solidFill>
+              </a:rPr>
+              <a:t>Pretty much in every known and used language and platform.</a:t>
+            </a:r>
+          </a:p>
+          <a:p>
+            <a:pPr algn="ctr"/>
+            <a:r>
+              <a:rPr lang="en-US" sz="1600" i="1" dirty="0">
+                <a:solidFill>
+                  <a:schemeClr val="tx1">
+                    <a:lumMod val="50000"/>
+                    <a:lumOff val="50000"/>
+                  </a:schemeClr>
+                </a:solidFill>
+              </a:rPr>
+              <a:t>Just Google around and you’ll find usable implementations</a:t>
+            </a:r>
+          </a:p>
+          <a:p>
+            <a:pPr algn="ctr"/>
+            <a:r>
+              <a:rPr lang="en-US" sz="1600" i="1" dirty="0">
+                <a:solidFill>
+                  <a:schemeClr val="tx1">
+                    <a:lumMod val="50000"/>
+                    <a:lumOff val="50000"/>
+                  </a:schemeClr>
+                </a:solidFill>
+              </a:rPr>
+              <a:t>of most if not all String Metrics algorithms for your language.</a:t>
+            </a:r>
+            <a:endParaRPr lang="LID4096" sz="1600" i="1" dirty="0">
+              <a:solidFill>
+                <a:schemeClr val="tx1">
+                  <a:lumMod val="50000"/>
+                  <a:lumOff val="50000"/>
+                </a:schemeClr>
+              </a:solidFill>
+            </a:endParaRPr>
+          </a:p>
+        </p:txBody>
+      </p:sp>
+      <p:sp>
+        <p:nvSpPr>
+          <p:cNvPr id="18" name="TextBox 17">
+            <a:extLst>
+              <a:ext uri="{FF2B5EF4-FFF2-40B4-BE49-F238E27FC236}">
+                <a16:creationId xmlns:a16="http://schemas.microsoft.com/office/drawing/2014/main" id="{B226E393-F8B5-49DE-B14B-6D750FFD42C8}"/>
+              </a:ext>
+            </a:extLst>
+          </p:cNvPr>
+          <p:cNvSpPr txBox="1"/>
+          <p:nvPr/>
+        </p:nvSpPr>
+        <p:spPr>
+          <a:xfrm>
+            <a:off x="3310128" y="4504944"/>
+            <a:ext cx="1153586" cy="369332"/>
+          </a:xfrm>
+          <a:prstGeom prst="rect">
+            <a:avLst/>
+          </a:prstGeom>
+          <a:noFill/>
+        </p:spPr>
+        <p:txBody>
+          <a:bodyPr wrap="none" rtlCol="0">
+            <a:spAutoFit/>
+          </a:bodyPr>
+          <a:lstStyle/>
+          <a:p>
+            <a:r>
+              <a:rPr lang="en-US" dirty="0"/>
+              <a:t>.NET (C#)</a:t>
+            </a:r>
+          </a:p>
+        </p:txBody>
+      </p:sp>
+      <p:sp>
+        <p:nvSpPr>
+          <p:cNvPr id="19" name="TextBox 18">
+            <a:extLst>
+              <a:ext uri="{FF2B5EF4-FFF2-40B4-BE49-F238E27FC236}">
+                <a16:creationId xmlns:a16="http://schemas.microsoft.com/office/drawing/2014/main" id="{BD98200C-54EB-4349-B8DD-739E944DEE5F}"/>
+              </a:ext>
+            </a:extLst>
+          </p:cNvPr>
+          <p:cNvSpPr txBox="1"/>
+          <p:nvPr/>
+        </p:nvSpPr>
+        <p:spPr>
+          <a:xfrm>
+            <a:off x="7327392" y="4303776"/>
+            <a:ext cx="641522" cy="369332"/>
+          </a:xfrm>
+          <a:prstGeom prst="rect">
+            <a:avLst/>
+          </a:prstGeom>
+          <a:noFill/>
+        </p:spPr>
+        <p:txBody>
+          <a:bodyPr wrap="none" rtlCol="0">
+            <a:spAutoFit/>
+          </a:bodyPr>
+          <a:lstStyle/>
+          <a:p>
+            <a:r>
+              <a:rPr lang="en-US" dirty="0"/>
+              <a:t>Java</a:t>
+            </a:r>
+            <a:endParaRPr lang="LID4096" dirty="0"/>
+          </a:p>
+        </p:txBody>
+      </p:sp>
+      <p:sp>
+        <p:nvSpPr>
+          <p:cNvPr id="20" name="TextBox 19">
+            <a:extLst>
+              <a:ext uri="{FF2B5EF4-FFF2-40B4-BE49-F238E27FC236}">
+                <a16:creationId xmlns:a16="http://schemas.microsoft.com/office/drawing/2014/main" id="{F4DB0D6E-EAFF-4DC9-A645-77BCA2F95F18}"/>
+              </a:ext>
+            </a:extLst>
+          </p:cNvPr>
+          <p:cNvSpPr txBox="1"/>
+          <p:nvPr/>
+        </p:nvSpPr>
+        <p:spPr>
+          <a:xfrm>
+            <a:off x="5730240" y="4874276"/>
+            <a:ext cx="575799" cy="369332"/>
+          </a:xfrm>
+          <a:prstGeom prst="rect">
+            <a:avLst/>
+          </a:prstGeom>
+          <a:noFill/>
+        </p:spPr>
+        <p:txBody>
+          <a:bodyPr wrap="none" rtlCol="0">
+            <a:spAutoFit/>
+          </a:bodyPr>
+          <a:lstStyle/>
+          <a:p>
+            <a:r>
+              <a:rPr lang="en-US" dirty="0"/>
+              <a:t>C++</a:t>
+            </a:r>
+            <a:endParaRPr lang="LID4096" dirty="0"/>
+          </a:p>
+        </p:txBody>
+      </p:sp>
+      <p:sp>
+        <p:nvSpPr>
+          <p:cNvPr id="21" name="TextBox 20">
+            <a:extLst>
+              <a:ext uri="{FF2B5EF4-FFF2-40B4-BE49-F238E27FC236}">
+                <a16:creationId xmlns:a16="http://schemas.microsoft.com/office/drawing/2014/main" id="{1A87BB8E-1416-4CF9-82D6-AB8611658B0B}"/>
+              </a:ext>
+            </a:extLst>
+          </p:cNvPr>
+          <p:cNvSpPr txBox="1"/>
+          <p:nvPr/>
+        </p:nvSpPr>
+        <p:spPr>
+          <a:xfrm>
+            <a:off x="7648153" y="3364992"/>
+            <a:ext cx="870751" cy="369332"/>
+          </a:xfrm>
+          <a:prstGeom prst="rect">
+            <a:avLst/>
+          </a:prstGeom>
+          <a:noFill/>
+        </p:spPr>
+        <p:txBody>
+          <a:bodyPr wrap="none" rtlCol="0">
+            <a:spAutoFit/>
+          </a:bodyPr>
+          <a:lstStyle/>
+          <a:p>
+            <a:r>
+              <a:rPr lang="en-US" dirty="0"/>
+              <a:t>Python</a:t>
+            </a:r>
+            <a:endParaRPr lang="LID4096" dirty="0"/>
           </a:p>
         </p:txBody>
       </p:sp>
     </p:spTree>
     <p:extLst>
       <p:ext uri="{BB962C8B-B14F-4D97-AF65-F5344CB8AC3E}">
-        <p14:creationId xmlns:p14="http://schemas.microsoft.com/office/powerpoint/2010/main" val="707789176"/>
+        <p14:creationId xmlns:p14="http://schemas.microsoft.com/office/powerpoint/2010/main" val="4001127823"/>
       </p:ext>
     </p:extLst>
   </p:cSld>
@@ -17686,24 +17977,24 @@
       </p:grpSpPr>
       <p:sp>
         <p:nvSpPr>
-          <p:cNvPr id="3" name="Title 2">
-            <a:extLst>
-              <a:ext uri="{FF2B5EF4-FFF2-40B4-BE49-F238E27FC236}">
-                <a16:creationId xmlns:a16="http://schemas.microsoft.com/office/drawing/2014/main" id="{4F47C549-7D1E-4480-91DC-BBB37404469D}"/>
-              </a:ext>
-            </a:extLst>
-          </p:cNvPr>
-          <p:cNvSpPr>
-            <a:spLocks noGrp="1"/>
-          </p:cNvSpPr>
-          <p:nvPr>
-            <p:ph type="title"/>
-          </p:nvPr>
-        </p:nvSpPr>
-        <p:spPr>
-          <a:xfrm>
-            <a:off x="6883644" y="3190386"/>
-            <a:ext cx="2346325" cy="477228"/>
+          <p:cNvPr id="2" name="Title 1">
+            <a:extLst>
+              <a:ext uri="{FF2B5EF4-FFF2-40B4-BE49-F238E27FC236}">
+                <a16:creationId xmlns:a16="http://schemas.microsoft.com/office/drawing/2014/main" id="{A29DE7F2-E890-4744-88DD-A75F5E300513}"/>
+              </a:ext>
+            </a:extLst>
+          </p:cNvPr>
+          <p:cNvSpPr>
+            <a:spLocks noGrp="1"/>
+          </p:cNvSpPr>
+          <p:nvPr>
+            <p:ph type="ctrTitle"/>
+          </p:nvPr>
+        </p:nvSpPr>
+        <p:spPr>
+          <a:xfrm>
+            <a:off x="6991350" y="2571235"/>
+            <a:ext cx="4179570" cy="1715531"/>
           </a:xfrm>
         </p:spPr>
         <p:txBody>
@@ -17712,16 +18003,15 @@
           <a:p>
             <a:r>
               <a:rPr lang="en-US" dirty="0"/>
-              <a:t>Questions?</a:t>
-            </a:r>
-            <a:endParaRPr lang="LID4096" dirty="0"/>
+              <a:t>DEMO</a:t>
+            </a:r>
           </a:p>
         </p:txBody>
       </p:sp>
     </p:spTree>
     <p:extLst>
       <p:ext uri="{BB962C8B-B14F-4D97-AF65-F5344CB8AC3E}">
-        <p14:creationId xmlns:p14="http://schemas.microsoft.com/office/powerpoint/2010/main" val="4223898165"/>
+        <p14:creationId xmlns:p14="http://schemas.microsoft.com/office/powerpoint/2010/main" val="707789176"/>
       </p:ext>
     </p:extLst>
   </p:cSld>
@@ -17750,6 +18040,70 @@
       </p:grpSpPr>
       <p:sp>
         <p:nvSpPr>
+          <p:cNvPr id="3" name="Title 2">
+            <a:extLst>
+              <a:ext uri="{FF2B5EF4-FFF2-40B4-BE49-F238E27FC236}">
+                <a16:creationId xmlns:a16="http://schemas.microsoft.com/office/drawing/2014/main" id="{4F47C549-7D1E-4480-91DC-BBB37404469D}"/>
+              </a:ext>
+            </a:extLst>
+          </p:cNvPr>
+          <p:cNvSpPr>
+            <a:spLocks noGrp="1"/>
+          </p:cNvSpPr>
+          <p:nvPr>
+            <p:ph type="title"/>
+          </p:nvPr>
+        </p:nvSpPr>
+        <p:spPr>
+          <a:xfrm>
+            <a:off x="6883644" y="3190386"/>
+            <a:ext cx="2346325" cy="477228"/>
+          </a:xfrm>
+        </p:spPr>
+        <p:txBody>
+          <a:bodyPr/>
+          <a:lstStyle/>
+          <a:p>
+            <a:r>
+              <a:rPr lang="en-US" dirty="0"/>
+              <a:t>Questions?</a:t>
+            </a:r>
+            <a:endParaRPr lang="LID4096" dirty="0"/>
+          </a:p>
+        </p:txBody>
+      </p:sp>
+    </p:spTree>
+    <p:extLst>
+      <p:ext uri="{BB962C8B-B14F-4D97-AF65-F5344CB8AC3E}">
+        <p14:creationId xmlns:p14="http://schemas.microsoft.com/office/powerpoint/2010/main" val="4223898165"/>
+      </p:ext>
+    </p:extLst>
+  </p:cSld>
+  <p:clrMapOvr>
+    <a:masterClrMapping/>
+  </p:clrMapOvr>
+</p:sld>
+</file>
+
+<file path=ppt/slides/slide9.xml><?xml version="1.0" encoding="utf-8"?>
+<p:sld xmlns:a="http://schemas.openxmlformats.org/drawingml/2006/main" xmlns:r="http://schemas.openxmlformats.org/officeDocument/2006/relationships" xmlns:p="http://schemas.openxmlformats.org/presentationml/2006/main">
+  <p:cSld>
+    <p:spTree>
+      <p:nvGrpSpPr>
+        <p:cNvPr id="1" name=""/>
+        <p:cNvGrpSpPr/>
+        <p:nvPr/>
+      </p:nvGrpSpPr>
+      <p:grpSpPr>
+        <a:xfrm>
+          <a:off x="0" y="0"/>
+          <a:ext cx="0" cy="0"/>
+          <a:chOff x="0" y="0"/>
+          <a:chExt cx="0" cy="0"/>
+        </a:xfrm>
+      </p:grpSpPr>
+      <p:sp>
+        <p:nvSpPr>
           <p:cNvPr id="2" name="Title 1">
             <a:extLst>
               <a:ext uri="{FF2B5EF4-FFF2-40B4-BE49-F238E27FC236}">
@@ -17881,7 +18235,7 @@
             <a:fld id="{B5CEABB6-07DC-46E8-9B57-56EC44A396E5}" type="slidenum">
               <a:rPr lang="en-US" smtClean="0"/>
               <a:pPr/>
-              <a:t>8</a:t>
+              <a:t>9</a:t>
             </a:fld>
             <a:endParaRPr lang="en-US" dirty="0"/>
           </a:p>
@@ -18968,6 +19322,15 @@
 </file>
 
 <file path=customXml/item2.xml><?xml version="1.0" encoding="utf-8"?>
+<?mso-contentType ?>
+<FormTemplates xmlns="http://schemas.microsoft.com/sharepoint/v3/contenttype/forms">
+  <Display>DocumentLibraryForm</Display>
+  <Edit>DocumentLibraryForm</Edit>
+  <New>DocumentLibraryForm</New>
+</FormTemplates>
+</file>
+
+<file path=customXml/item3.xml><?xml version="1.0" encoding="utf-8"?>
 <p:properties xmlns:p="http://schemas.microsoft.com/office/2006/metadata/properties" xmlns:xsi="http://www.w3.org/2001/XMLSchema-instance" xmlns:pc="http://schemas.microsoft.com/office/infopath/2007/PartnerControls">
   <documentManagement>
     <_ip_UnifiedCompliancePolicyUIAction xmlns="http://schemas.microsoft.com/sharepoint/v3" xsi:nil="true"/>
@@ -18984,15 +19347,6 @@
     <MediaServiceKeyPoints xmlns="71af3243-3dd4-4a8d-8c0d-dd76da1f02a5" xsi:nil="true"/>
   </documentManagement>
 </p:properties>
-</file>
-
-<file path=customXml/item3.xml><?xml version="1.0" encoding="utf-8"?>
-<?mso-contentType ?>
-<FormTemplates xmlns="http://schemas.microsoft.com/sharepoint/v3/contenttype/forms">
-  <Display>DocumentLibraryForm</Display>
-  <Edit>DocumentLibraryForm</Edit>
-  <New>DocumentLibraryForm</New>
-</FormTemplates>
 </file>
 
 <file path=customXml/itemProps1.xml><?xml version="1.0" encoding="utf-8"?>
@@ -19017,6 +19371,14 @@
 </file>
 
 <file path=customXml/itemProps2.xml><?xml version="1.0" encoding="utf-8"?>
+<ds:datastoreItem xmlns:ds="http://schemas.openxmlformats.org/officeDocument/2006/customXml" ds:itemID="{42BC90D6-94CF-42F7-AAC4-9CF6824C54D5}">
+  <ds:schemaRefs>
+    <ds:schemaRef ds:uri="http://schemas.microsoft.com/sharepoint/v3/contenttype/forms"/>
+  </ds:schemaRefs>
+</ds:datastoreItem>
+</file>
+
+<file path=customXml/itemProps3.xml><?xml version="1.0" encoding="utf-8"?>
 <ds:datastoreItem xmlns:ds="http://schemas.openxmlformats.org/officeDocument/2006/customXml" ds:itemID="{7F97B18F-50BC-4F30-8373-93489E845F83}">
   <ds:schemaRefs>
     <ds:schemaRef ds:uri="http://schemas.microsoft.com/office/2006/metadata/properties"/>
@@ -19028,14 +19390,6 @@
 </ds:datastoreItem>
 </file>
 
-<file path=customXml/itemProps3.xml><?xml version="1.0" encoding="utf-8"?>
-<ds:datastoreItem xmlns:ds="http://schemas.openxmlformats.org/officeDocument/2006/customXml" ds:itemID="{42BC90D6-94CF-42F7-AAC4-9CF6824C54D5}">
-  <ds:schemaRefs>
-    <ds:schemaRef ds:uri="http://schemas.microsoft.com/sharepoint/v3/contenttype/forms"/>
-  </ds:schemaRefs>
-</ds:datastoreItem>
-</file>
-
 <file path=docMetadata/LabelInfo.xml><?xml version="1.0" encoding="utf-8"?>
 <clbl:labelList xmlns:clbl="http://schemas.microsoft.com/office/2020/mipLabelMetadata">
   <clbl:label id="{f42aa342-8706-4288-bd11-ebb85995028c}" enabled="1" method="Standard" siteId="{72f988bf-86f1-41af-91ab-2d7cd011db47}" removed="0"/>

</xml_diff>